<commit_message>
Added my working diagrams
</commit_message>
<xml_diff>
--- a/TeX/report_mlp/MLP_Diagrams.pptx
+++ b/TeX/report_mlp/MLP_Diagrams.pptx
@@ -4,8 +4,14 @@
   <p:sldMasterIdLst>
     <p:sldMasterId id="2147483648" r:id="rId1"/>
   </p:sldMasterIdLst>
+  <p:notesMasterIdLst>
+    <p:notesMasterId r:id="rId6"/>
+  </p:notesMasterIdLst>
   <p:sldIdLst>
     <p:sldId id="256" r:id="rId2"/>
+    <p:sldId id="257" r:id="rId3"/>
+    <p:sldId id="258" r:id="rId4"/>
+    <p:sldId id="259" r:id="rId5"/>
   </p:sldIdLst>
   <p:sldSz cx="12192000" cy="6858000"/>
   <p:notesSz cx="6858000" cy="9144000"/>
@@ -104,7 +110,362 @@
       </a:defRPr>
     </a:lvl9pPr>
   </p:defaultTextStyle>
+  <p:extLst>
+    <p:ext uri="{EFAFB233-063F-42B5-8137-9DF3F51BA10A}">
+      <p15:sldGuideLst xmlns:p15="http://schemas.microsoft.com/office/powerpoint/2012/main"/>
+    </p:ext>
+  </p:extLst>
 </p:presentation>
+</file>
+
+<file path=ppt/notesMasters/notesMaster1.xml><?xml version="1.0" encoding="utf-8"?>
+<p:notesMaster xmlns:a="http://schemas.openxmlformats.org/drawingml/2006/main" xmlns:r="http://schemas.openxmlformats.org/officeDocument/2006/relationships" xmlns:p="http://schemas.openxmlformats.org/presentationml/2006/main">
+  <p:cSld>
+    <p:bg>
+      <p:bgRef idx="1001">
+        <a:schemeClr val="bg1"/>
+      </p:bgRef>
+    </p:bg>
+    <p:spTree>
+      <p:nvGrpSpPr>
+        <p:cNvPr id="1" name=""/>
+        <p:cNvGrpSpPr/>
+        <p:nvPr/>
+      </p:nvGrpSpPr>
+      <p:grpSpPr>
+        <a:xfrm>
+          <a:off x="0" y="0"/>
+          <a:ext cx="0" cy="0"/>
+          <a:chOff x="0" y="0"/>
+          <a:chExt cx="0" cy="0"/>
+        </a:xfrm>
+      </p:grpSpPr>
+      <p:sp>
+        <p:nvSpPr>
+          <p:cNvPr id="2" name="Header Placeholder 1"/>
+          <p:cNvSpPr>
+            <a:spLocks noGrp="1"/>
+          </p:cNvSpPr>
+          <p:nvPr>
+            <p:ph type="hdr" sz="quarter"/>
+          </p:nvPr>
+        </p:nvSpPr>
+        <p:spPr>
+          <a:xfrm>
+            <a:off x="0" y="0"/>
+            <a:ext cx="2971800" cy="458788"/>
+          </a:xfrm>
+          <a:prstGeom prst="rect">
+            <a:avLst/>
+          </a:prstGeom>
+        </p:spPr>
+        <p:txBody>
+          <a:bodyPr vert="horz" lIns="91440" tIns="45720" rIns="91440" bIns="45720" rtlCol="0"/>
+          <a:lstStyle>
+            <a:lvl1pPr algn="l">
+              <a:defRPr sz="1200"/>
+            </a:lvl1pPr>
+          </a:lstStyle>
+          <a:p>
+            <a:endParaRPr lang="en-US"/>
+          </a:p>
+        </p:txBody>
+      </p:sp>
+      <p:sp>
+        <p:nvSpPr>
+          <p:cNvPr id="3" name="Date Placeholder 2"/>
+          <p:cNvSpPr>
+            <a:spLocks noGrp="1"/>
+          </p:cNvSpPr>
+          <p:nvPr>
+            <p:ph type="dt" idx="1"/>
+          </p:nvPr>
+        </p:nvSpPr>
+        <p:spPr>
+          <a:xfrm>
+            <a:off x="3884613" y="0"/>
+            <a:ext cx="2971800" cy="458788"/>
+          </a:xfrm>
+          <a:prstGeom prst="rect">
+            <a:avLst/>
+          </a:prstGeom>
+        </p:spPr>
+        <p:txBody>
+          <a:bodyPr vert="horz" lIns="91440" tIns="45720" rIns="91440" bIns="45720" rtlCol="0"/>
+          <a:lstStyle>
+            <a:lvl1pPr algn="r">
+              <a:defRPr sz="1200"/>
+            </a:lvl1pPr>
+          </a:lstStyle>
+          <a:p>
+            <a:fld id="{D731DB18-C4E1-0E43-8266-2E6281337D46}" type="datetimeFigureOut">
+              <a:rPr lang="en-US" smtClean="0"/>
+              <a:t>12/3/17</a:t>
+            </a:fld>
+            <a:endParaRPr lang="en-US"/>
+          </a:p>
+        </p:txBody>
+      </p:sp>
+      <p:sp>
+        <p:nvSpPr>
+          <p:cNvPr id="4" name="Slide Image Placeholder 3"/>
+          <p:cNvSpPr>
+            <a:spLocks noGrp="1" noRot="1" noChangeAspect="1"/>
+          </p:cNvSpPr>
+          <p:nvPr>
+            <p:ph type="sldImg" idx="2"/>
+          </p:nvPr>
+        </p:nvSpPr>
+        <p:spPr>
+          <a:xfrm>
+            <a:off x="685800" y="1143000"/>
+            <a:ext cx="5486400" cy="3086100"/>
+          </a:xfrm>
+          <a:prstGeom prst="rect">
+            <a:avLst/>
+          </a:prstGeom>
+          <a:noFill/>
+          <a:ln w="12700">
+            <a:solidFill>
+              <a:prstClr val="black"/>
+            </a:solidFill>
+          </a:ln>
+        </p:spPr>
+        <p:txBody>
+          <a:bodyPr vert="horz" lIns="91440" tIns="45720" rIns="91440" bIns="45720" rtlCol="0" anchor="ctr"/>
+          <a:lstStyle/>
+          <a:p>
+            <a:endParaRPr lang="en-US"/>
+          </a:p>
+        </p:txBody>
+      </p:sp>
+      <p:sp>
+        <p:nvSpPr>
+          <p:cNvPr id="5" name="Notes Placeholder 4"/>
+          <p:cNvSpPr>
+            <a:spLocks noGrp="1"/>
+          </p:cNvSpPr>
+          <p:nvPr>
+            <p:ph type="body" sz="quarter" idx="3"/>
+          </p:nvPr>
+        </p:nvSpPr>
+        <p:spPr>
+          <a:xfrm>
+            <a:off x="685800" y="4400550"/>
+            <a:ext cx="5486400" cy="3600450"/>
+          </a:xfrm>
+          <a:prstGeom prst="rect">
+            <a:avLst/>
+          </a:prstGeom>
+        </p:spPr>
+        <p:txBody>
+          <a:bodyPr vert="horz" lIns="91440" tIns="45720" rIns="91440" bIns="45720" rtlCol="0"/>
+          <a:lstStyle/>
+          <a:p>
+            <a:pPr lvl="0"/>
+            <a:r>
+              <a:rPr lang="en-US" smtClean="0"/>
+              <a:t>Click to edit Master text styles</a:t>
+            </a:r>
+          </a:p>
+          <a:p>
+            <a:pPr lvl="1"/>
+            <a:r>
+              <a:rPr lang="en-US" smtClean="0"/>
+              <a:t>Second level</a:t>
+            </a:r>
+          </a:p>
+          <a:p>
+            <a:pPr lvl="2"/>
+            <a:r>
+              <a:rPr lang="en-US" smtClean="0"/>
+              <a:t>Third level</a:t>
+            </a:r>
+          </a:p>
+          <a:p>
+            <a:pPr lvl="3"/>
+            <a:r>
+              <a:rPr lang="en-US" smtClean="0"/>
+              <a:t>Fourth level</a:t>
+            </a:r>
+          </a:p>
+          <a:p>
+            <a:pPr lvl="4"/>
+            <a:r>
+              <a:rPr lang="en-US" smtClean="0"/>
+              <a:t>Fifth level</a:t>
+            </a:r>
+            <a:endParaRPr lang="en-US"/>
+          </a:p>
+        </p:txBody>
+      </p:sp>
+      <p:sp>
+        <p:nvSpPr>
+          <p:cNvPr id="6" name="Footer Placeholder 5"/>
+          <p:cNvSpPr>
+            <a:spLocks noGrp="1"/>
+          </p:cNvSpPr>
+          <p:nvPr>
+            <p:ph type="ftr" sz="quarter" idx="4"/>
+          </p:nvPr>
+        </p:nvSpPr>
+        <p:spPr>
+          <a:xfrm>
+            <a:off x="0" y="8685213"/>
+            <a:ext cx="2971800" cy="458787"/>
+          </a:xfrm>
+          <a:prstGeom prst="rect">
+            <a:avLst/>
+          </a:prstGeom>
+        </p:spPr>
+        <p:txBody>
+          <a:bodyPr vert="horz" lIns="91440" tIns="45720" rIns="91440" bIns="45720" rtlCol="0" anchor="b"/>
+          <a:lstStyle>
+            <a:lvl1pPr algn="l">
+              <a:defRPr sz="1200"/>
+            </a:lvl1pPr>
+          </a:lstStyle>
+          <a:p>
+            <a:endParaRPr lang="en-US"/>
+          </a:p>
+        </p:txBody>
+      </p:sp>
+      <p:sp>
+        <p:nvSpPr>
+          <p:cNvPr id="7" name="Slide Number Placeholder 6"/>
+          <p:cNvSpPr>
+            <a:spLocks noGrp="1"/>
+          </p:cNvSpPr>
+          <p:nvPr>
+            <p:ph type="sldNum" sz="quarter" idx="5"/>
+          </p:nvPr>
+        </p:nvSpPr>
+        <p:spPr>
+          <a:xfrm>
+            <a:off x="3884613" y="8685213"/>
+            <a:ext cx="2971800" cy="458787"/>
+          </a:xfrm>
+          <a:prstGeom prst="rect">
+            <a:avLst/>
+          </a:prstGeom>
+        </p:spPr>
+        <p:txBody>
+          <a:bodyPr vert="horz" lIns="91440" tIns="45720" rIns="91440" bIns="45720" rtlCol="0" anchor="b"/>
+          <a:lstStyle>
+            <a:lvl1pPr algn="r">
+              <a:defRPr sz="1200"/>
+            </a:lvl1pPr>
+          </a:lstStyle>
+          <a:p>
+            <a:fld id="{5A20EEF8-5E78-904D-8594-45F950295278}" type="slidenum">
+              <a:rPr lang="en-US" smtClean="0"/>
+              <a:t>‹#›</a:t>
+            </a:fld>
+            <a:endParaRPr lang="en-US"/>
+          </a:p>
+        </p:txBody>
+      </p:sp>
+    </p:spTree>
+    <p:extLst>
+      <p:ext uri="{BB962C8B-B14F-4D97-AF65-F5344CB8AC3E}">
+        <p14:creationId xmlns:p14="http://schemas.microsoft.com/office/powerpoint/2010/main" val="146948597"/>
+      </p:ext>
+    </p:extLst>
+  </p:cSld>
+  <p:clrMap bg1="lt1" tx1="dk1" bg2="lt2" tx2="dk2" accent1="accent1" accent2="accent2" accent3="accent3" accent4="accent4" accent5="accent5" accent6="accent6" hlink="hlink" folHlink="folHlink"/>
+  <p:notesStyle>
+    <a:lvl1pPr marL="0" algn="l" defTabSz="914400" rtl="0" eaLnBrk="1" latinLnBrk="0" hangingPunct="1">
+      <a:defRPr sz="1200" kern="1200">
+        <a:solidFill>
+          <a:schemeClr val="tx1"/>
+        </a:solidFill>
+        <a:latin typeface="+mn-lt"/>
+        <a:ea typeface="+mn-ea"/>
+        <a:cs typeface="+mn-cs"/>
+      </a:defRPr>
+    </a:lvl1pPr>
+    <a:lvl2pPr marL="457200" algn="l" defTabSz="914400" rtl="0" eaLnBrk="1" latinLnBrk="0" hangingPunct="1">
+      <a:defRPr sz="1200" kern="1200">
+        <a:solidFill>
+          <a:schemeClr val="tx1"/>
+        </a:solidFill>
+        <a:latin typeface="+mn-lt"/>
+        <a:ea typeface="+mn-ea"/>
+        <a:cs typeface="+mn-cs"/>
+      </a:defRPr>
+    </a:lvl2pPr>
+    <a:lvl3pPr marL="914400" algn="l" defTabSz="914400" rtl="0" eaLnBrk="1" latinLnBrk="0" hangingPunct="1">
+      <a:defRPr sz="1200" kern="1200">
+        <a:solidFill>
+          <a:schemeClr val="tx1"/>
+        </a:solidFill>
+        <a:latin typeface="+mn-lt"/>
+        <a:ea typeface="+mn-ea"/>
+        <a:cs typeface="+mn-cs"/>
+      </a:defRPr>
+    </a:lvl3pPr>
+    <a:lvl4pPr marL="1371600" algn="l" defTabSz="914400" rtl="0" eaLnBrk="1" latinLnBrk="0" hangingPunct="1">
+      <a:defRPr sz="1200" kern="1200">
+        <a:solidFill>
+          <a:schemeClr val="tx1"/>
+        </a:solidFill>
+        <a:latin typeface="+mn-lt"/>
+        <a:ea typeface="+mn-ea"/>
+        <a:cs typeface="+mn-cs"/>
+      </a:defRPr>
+    </a:lvl4pPr>
+    <a:lvl5pPr marL="1828800" algn="l" defTabSz="914400" rtl="0" eaLnBrk="1" latinLnBrk="0" hangingPunct="1">
+      <a:defRPr sz="1200" kern="1200">
+        <a:solidFill>
+          <a:schemeClr val="tx1"/>
+        </a:solidFill>
+        <a:latin typeface="+mn-lt"/>
+        <a:ea typeface="+mn-ea"/>
+        <a:cs typeface="+mn-cs"/>
+      </a:defRPr>
+    </a:lvl5pPr>
+    <a:lvl6pPr marL="2286000" algn="l" defTabSz="914400" rtl="0" eaLnBrk="1" latinLnBrk="0" hangingPunct="1">
+      <a:defRPr sz="1200" kern="1200">
+        <a:solidFill>
+          <a:schemeClr val="tx1"/>
+        </a:solidFill>
+        <a:latin typeface="+mn-lt"/>
+        <a:ea typeface="+mn-ea"/>
+        <a:cs typeface="+mn-cs"/>
+      </a:defRPr>
+    </a:lvl6pPr>
+    <a:lvl7pPr marL="2743200" algn="l" defTabSz="914400" rtl="0" eaLnBrk="1" latinLnBrk="0" hangingPunct="1">
+      <a:defRPr sz="1200" kern="1200">
+        <a:solidFill>
+          <a:schemeClr val="tx1"/>
+        </a:solidFill>
+        <a:latin typeface="+mn-lt"/>
+        <a:ea typeface="+mn-ea"/>
+        <a:cs typeface="+mn-cs"/>
+      </a:defRPr>
+    </a:lvl7pPr>
+    <a:lvl8pPr marL="3200400" algn="l" defTabSz="914400" rtl="0" eaLnBrk="1" latinLnBrk="0" hangingPunct="1">
+      <a:defRPr sz="1200" kern="1200">
+        <a:solidFill>
+          <a:schemeClr val="tx1"/>
+        </a:solidFill>
+        <a:latin typeface="+mn-lt"/>
+        <a:ea typeface="+mn-ea"/>
+        <a:cs typeface="+mn-cs"/>
+      </a:defRPr>
+    </a:lvl8pPr>
+    <a:lvl9pPr marL="3657600" algn="l" defTabSz="914400" rtl="0" eaLnBrk="1" latinLnBrk="0" hangingPunct="1">
+      <a:defRPr sz="1200" kern="1200">
+        <a:solidFill>
+          <a:schemeClr val="tx1"/>
+        </a:solidFill>
+        <a:latin typeface="+mn-lt"/>
+        <a:ea typeface="+mn-ea"/>
+        <a:cs typeface="+mn-cs"/>
+      </a:defRPr>
+    </a:lvl9pPr>
+  </p:notesStyle>
+</p:notesMaster>
 </file>
 
 <file path=ppt/slideLayouts/slideLayout1.xml><?xml version="1.0" encoding="utf-8"?>
@@ -238,7 +599,7 @@
           <a:p>
             <a:fld id="{C07B8468-7E06-024D-97BE-1A430BD7CFD9}" type="datetimeFigureOut">
               <a:rPr lang="en-US" smtClean="0"/>
-              <a:t>11/28/17</a:t>
+              <a:t>12/2/17</a:t>
             </a:fld>
             <a:endParaRPr lang="en-US"/>
           </a:p>
@@ -408,7 +769,7 @@
           <a:p>
             <a:fld id="{C07B8468-7E06-024D-97BE-1A430BD7CFD9}" type="datetimeFigureOut">
               <a:rPr lang="en-US" smtClean="0"/>
-              <a:t>11/28/17</a:t>
+              <a:t>12/2/17</a:t>
             </a:fld>
             <a:endParaRPr lang="en-US"/>
           </a:p>
@@ -588,7 +949,7 @@
           <a:p>
             <a:fld id="{C07B8468-7E06-024D-97BE-1A430BD7CFD9}" type="datetimeFigureOut">
               <a:rPr lang="en-US" smtClean="0"/>
-              <a:t>11/28/17</a:t>
+              <a:t>12/2/17</a:t>
             </a:fld>
             <a:endParaRPr lang="en-US"/>
           </a:p>
@@ -758,7 +1119,7 @@
           <a:p>
             <a:fld id="{C07B8468-7E06-024D-97BE-1A430BD7CFD9}" type="datetimeFigureOut">
               <a:rPr lang="en-US" smtClean="0"/>
-              <a:t>11/28/17</a:t>
+              <a:t>12/2/17</a:t>
             </a:fld>
             <a:endParaRPr lang="en-US"/>
           </a:p>
@@ -1004,7 +1365,7 @@
           <a:p>
             <a:fld id="{C07B8468-7E06-024D-97BE-1A430BD7CFD9}" type="datetimeFigureOut">
               <a:rPr lang="en-US" smtClean="0"/>
-              <a:t>11/28/17</a:t>
+              <a:t>12/2/17</a:t>
             </a:fld>
             <a:endParaRPr lang="en-US"/>
           </a:p>
@@ -1236,7 +1597,7 @@
           <a:p>
             <a:fld id="{C07B8468-7E06-024D-97BE-1A430BD7CFD9}" type="datetimeFigureOut">
               <a:rPr lang="en-US" smtClean="0"/>
-              <a:t>11/28/17</a:t>
+              <a:t>12/2/17</a:t>
             </a:fld>
             <a:endParaRPr lang="en-US"/>
           </a:p>
@@ -1603,7 +1964,7 @@
           <a:p>
             <a:fld id="{C07B8468-7E06-024D-97BE-1A430BD7CFD9}" type="datetimeFigureOut">
               <a:rPr lang="en-US" smtClean="0"/>
-              <a:t>11/28/17</a:t>
+              <a:t>12/2/17</a:t>
             </a:fld>
             <a:endParaRPr lang="en-US"/>
           </a:p>
@@ -1721,7 +2082,7 @@
           <a:p>
             <a:fld id="{C07B8468-7E06-024D-97BE-1A430BD7CFD9}" type="datetimeFigureOut">
               <a:rPr lang="en-US" smtClean="0"/>
-              <a:t>11/28/17</a:t>
+              <a:t>12/2/17</a:t>
             </a:fld>
             <a:endParaRPr lang="en-US"/>
           </a:p>
@@ -1816,7 +2177,7 @@
           <a:p>
             <a:fld id="{C07B8468-7E06-024D-97BE-1A430BD7CFD9}" type="datetimeFigureOut">
               <a:rPr lang="en-US" smtClean="0"/>
-              <a:t>11/28/17</a:t>
+              <a:t>12/2/17</a:t>
             </a:fld>
             <a:endParaRPr lang="en-US"/>
           </a:p>
@@ -2093,7 +2454,7 @@
           <a:p>
             <a:fld id="{C07B8468-7E06-024D-97BE-1A430BD7CFD9}" type="datetimeFigureOut">
               <a:rPr lang="en-US" smtClean="0"/>
-              <a:t>11/28/17</a:t>
+              <a:t>12/2/17</a:t>
             </a:fld>
             <a:endParaRPr lang="en-US"/>
           </a:p>
@@ -2346,7 +2707,7 @@
           <a:p>
             <a:fld id="{C07B8468-7E06-024D-97BE-1A430BD7CFD9}" type="datetimeFigureOut">
               <a:rPr lang="en-US" smtClean="0"/>
-              <a:t>11/28/17</a:t>
+              <a:t>12/2/17</a:t>
             </a:fld>
             <a:endParaRPr lang="en-US"/>
           </a:p>
@@ -2559,7 +2920,7 @@
           <a:p>
             <a:fld id="{C07B8468-7E06-024D-97BE-1A430BD7CFD9}" type="datetimeFigureOut">
               <a:rPr lang="en-US" smtClean="0"/>
-              <a:t>11/28/17</a:t>
+              <a:t>12/2/17</a:t>
             </a:fld>
             <a:endParaRPr lang="en-US"/>
           </a:p>
@@ -2964,8 +3325,8 @@
           <a:chExt cx="0" cy="0"/>
         </a:xfrm>
       </p:grpSpPr>
-      <mc:AlternateContent xmlns:mc="http://schemas.openxmlformats.org/markup-compatibility/2006">
-        <mc:Choice xmlns:a14="http://schemas.microsoft.com/office/drawing/2010/main" Requires="a14">
+      <mc:AlternateContent xmlns:mc="http://schemas.openxmlformats.org/markup-compatibility/2006" xmlns:a14="http://schemas.microsoft.com/office/drawing/2010/main">
+        <mc:Choice Requires="a14">
           <p:sp>
             <p:nvSpPr>
               <p:cNvPr id="6" name="Rectangle 5"/>
@@ -3244,7 +3605,17 @@
                                                     <a:effectLst/>
                                                     <a:latin typeface="Cambria Math" charset="0"/>
                                                   </a:rPr>
-                                                  <m:t>300</m:t>
+                                                  <m:t>3</m:t>
+                                                </m:r>
+                                                <m:r>
+                                                  <a:rPr lang="en-US" sz="2400" b="0" i="1" dirty="0" smtClean="0">
+                                                    <a:solidFill>
+                                                      <a:schemeClr val="tx1"/>
+                                                    </a:solidFill>
+                                                    <a:effectLst/>
+                                                    <a:latin typeface="Cambria Math" charset="0"/>
+                                                  </a:rPr>
+                                                  <m:t>00</m:t>
                                                 </m:r>
                                               </m:sub>
                                             </m:sSub>
@@ -3420,7 +3791,17 @@
                                                             <a:effectLst/>
                                                             <a:latin typeface="Cambria Math" charset="0"/>
                                                           </a:rPr>
-                                                          <m:t>300</m:t>
+                                                          <m:t>3</m:t>
+                                                        </m:r>
+                                                        <m:r>
+                                                          <a:rPr lang="en-US" sz="2400" b="0" i="1" dirty="0" smtClean="0">
+                                                            <a:solidFill>
+                                                              <a:schemeClr val="tx1"/>
+                                                            </a:solidFill>
+                                                            <a:effectLst/>
+                                                            <a:latin typeface="Cambria Math" charset="0"/>
+                                                          </a:rPr>
+                                                          <m:t>00</m:t>
                                                         </m:r>
                                                       </m:sub>
                                                     </m:sSub>
@@ -3452,7 +3833,7 @@
             </p:txBody>
           </p:sp>
         </mc:Choice>
-        <mc:Fallback>
+        <mc:Fallback xmlns="">
           <p:sp>
             <p:nvSpPr>
               <p:cNvPr id="6" name="Rectangle 5"/>
@@ -3510,7 +3891,7 @@
         </p:nvSpPr>
         <p:spPr>
           <a:xfrm>
-            <a:off x="2063827" y="4527511"/>
+            <a:off x="2063827" y="4350533"/>
             <a:ext cx="912429" cy="369332"/>
           </a:xfrm>
           <a:prstGeom prst="rect">
@@ -3662,8 +4043,8 @@
           </a:p>
         </p:txBody>
       </p:sp>
-      <mc:AlternateContent xmlns:mc="http://schemas.openxmlformats.org/markup-compatibility/2006">
-        <mc:Choice xmlns:a14="http://schemas.microsoft.com/office/drawing/2010/main" Requires="a14">
+      <mc:AlternateContent xmlns:mc="http://schemas.openxmlformats.org/markup-compatibility/2006" xmlns:a14="http://schemas.microsoft.com/office/drawing/2010/main">
+        <mc:Choice Requires="a14">
           <p:sp>
             <p:nvSpPr>
               <p:cNvPr id="13" name="Rectangle 12"/>
@@ -4160,7 +4541,7 @@
             </p:txBody>
           </p:sp>
         </mc:Choice>
-        <mc:Fallback>
+        <mc:Fallback xmlns="">
           <p:sp>
             <p:nvSpPr>
               <p:cNvPr id="13" name="Rectangle 12"/>
@@ -5316,7 +5697,7 @@
         </p:nvSpPr>
         <p:spPr>
           <a:xfrm>
-            <a:off x="9788528" y="4492164"/>
+            <a:off x="9788528" y="4315186"/>
             <a:ext cx="655949" cy="369332"/>
           </a:xfrm>
           <a:prstGeom prst="rect">
@@ -6026,7 +6407,7 @@
         </p:nvSpPr>
         <p:spPr>
           <a:xfrm>
-            <a:off x="3838590" y="4542900"/>
+            <a:off x="3838590" y="4365922"/>
             <a:ext cx="1042273" cy="338554"/>
           </a:xfrm>
           <a:prstGeom prst="rect">
@@ -6080,7 +6461,7 @@
         </p:nvSpPr>
         <p:spPr>
           <a:xfrm>
-            <a:off x="7294613" y="4522942"/>
+            <a:off x="7294613" y="4345964"/>
             <a:ext cx="1039067" cy="338554"/>
           </a:xfrm>
           <a:prstGeom prst="rect">
@@ -6095,7 +6476,7 @@
           <a:lstStyle/>
           <a:p>
             <a:r>
-              <a:rPr lang="en-US" sz="1600" i="1" dirty="0" err="1" smtClean="0">
+              <a:rPr lang="en-US" sz="1600" i="1" dirty="0" smtClean="0">
                 <a:latin typeface="Cambria Math" charset="0"/>
                 <a:ea typeface="Cambria Math" charset="0"/>
                 <a:cs typeface="Cambria Math" charset="0"/>
@@ -6103,7 +6484,7 @@
               <a:t>N</a:t>
             </a:r>
             <a:r>
-              <a:rPr lang="en-US" sz="1600" i="1" baseline="-25000" dirty="0" err="1" smtClean="0">
+              <a:rPr lang="en-US" sz="1600" i="1" baseline="-25000" dirty="0" smtClean="0">
                 <a:latin typeface="Cambria Math" charset="0"/>
                 <a:ea typeface="Cambria Math" charset="0"/>
                 <a:cs typeface="Cambria Math" charset="0"/>
@@ -6526,10 +6907,1332 @@
           </a:fontRef>
         </p:style>
       </p:cxnSp>
+      <p:sp>
+        <p:nvSpPr>
+          <p:cNvPr id="102" name="Striped Right Arrow 101"/>
+          <p:cNvSpPr/>
+          <p:nvPr/>
+        </p:nvSpPr>
+        <p:spPr>
+          <a:xfrm>
+            <a:off x="2796482" y="4660408"/>
+            <a:ext cx="6971071" cy="363794"/>
+          </a:xfrm>
+          <a:prstGeom prst="stripedRightArrow">
+            <a:avLst>
+              <a:gd name="adj1" fmla="val 60810"/>
+              <a:gd name="adj2" fmla="val 66216"/>
+            </a:avLst>
+          </a:prstGeom>
+          <a:gradFill flip="none" rotWithShape="1">
+            <a:gsLst>
+              <a:gs pos="89000">
+                <a:schemeClr val="bg1">
+                  <a:lumMod val="85000"/>
+                </a:schemeClr>
+              </a:gs>
+              <a:gs pos="0">
+                <a:schemeClr val="tx1"/>
+              </a:gs>
+              <a:gs pos="60000">
+                <a:schemeClr val="bg1">
+                  <a:lumMod val="75000"/>
+                </a:schemeClr>
+              </a:gs>
+              <a:gs pos="100000">
+                <a:schemeClr val="bg1">
+                  <a:lumMod val="95000"/>
+                </a:schemeClr>
+              </a:gs>
+            </a:gsLst>
+            <a:lin ang="10800000" scaled="1"/>
+            <a:tileRect/>
+          </a:gradFill>
+          <a:ln>
+            <a:noFill/>
+          </a:ln>
+        </p:spPr>
+        <p:style>
+          <a:lnRef idx="2">
+            <a:schemeClr val="accent1">
+              <a:shade val="50000"/>
+            </a:schemeClr>
+          </a:lnRef>
+          <a:fillRef idx="1">
+            <a:schemeClr val="accent1"/>
+          </a:fillRef>
+          <a:effectRef idx="0">
+            <a:schemeClr val="accent1"/>
+          </a:effectRef>
+          <a:fontRef idx="minor">
+            <a:schemeClr val="lt1"/>
+          </a:fontRef>
+        </p:style>
+        <p:txBody>
+          <a:bodyPr rtlCol="0" anchor="ctr"/>
+          <a:lstStyle/>
+          <a:p>
+            <a:pPr algn="ctr"/>
+            <a:r>
+              <a:rPr lang="en-US" dirty="0" smtClean="0"/>
+              <a:t>Update Function</a:t>
+            </a:r>
+            <a:endParaRPr lang="en-US" dirty="0"/>
+          </a:p>
+        </p:txBody>
+      </p:sp>
+      <p:sp>
+        <p:nvSpPr>
+          <p:cNvPr id="103" name="Striped Right Arrow 102"/>
+          <p:cNvSpPr/>
+          <p:nvPr/>
+        </p:nvSpPr>
+        <p:spPr>
+          <a:xfrm flipH="1">
+            <a:off x="2758465" y="891081"/>
+            <a:ext cx="6971071" cy="363794"/>
+          </a:xfrm>
+          <a:prstGeom prst="stripedRightArrow">
+            <a:avLst>
+              <a:gd name="adj1" fmla="val 60810"/>
+              <a:gd name="adj2" fmla="val 66216"/>
+            </a:avLst>
+          </a:prstGeom>
+          <a:gradFill flip="none" rotWithShape="1">
+            <a:gsLst>
+              <a:gs pos="89000">
+                <a:schemeClr val="bg1">
+                  <a:lumMod val="85000"/>
+                </a:schemeClr>
+              </a:gs>
+              <a:gs pos="0">
+                <a:schemeClr val="tx1"/>
+              </a:gs>
+              <a:gs pos="60000">
+                <a:schemeClr val="bg1">
+                  <a:lumMod val="75000"/>
+                </a:schemeClr>
+              </a:gs>
+              <a:gs pos="100000">
+                <a:schemeClr val="bg1">
+                  <a:lumMod val="95000"/>
+                </a:schemeClr>
+              </a:gs>
+            </a:gsLst>
+            <a:lin ang="10800000" scaled="1"/>
+            <a:tileRect/>
+          </a:gradFill>
+          <a:ln>
+            <a:noFill/>
+          </a:ln>
+        </p:spPr>
+        <p:style>
+          <a:lnRef idx="2">
+            <a:schemeClr val="accent1">
+              <a:shade val="50000"/>
+            </a:schemeClr>
+          </a:lnRef>
+          <a:fillRef idx="1">
+            <a:schemeClr val="accent1"/>
+          </a:fillRef>
+          <a:effectRef idx="0">
+            <a:schemeClr val="accent1"/>
+          </a:effectRef>
+          <a:fontRef idx="minor">
+            <a:schemeClr val="lt1"/>
+          </a:fontRef>
+        </p:style>
+        <p:txBody>
+          <a:bodyPr rtlCol="0" anchor="ctr"/>
+          <a:lstStyle/>
+          <a:p>
+            <a:pPr algn="ctr"/>
+            <a:r>
+              <a:rPr lang="en-US" smtClean="0"/>
+              <a:t>Learning </a:t>
+            </a:r>
+            <a:r>
+              <a:rPr lang="en-US" dirty="0" smtClean="0"/>
+              <a:t>Function</a:t>
+            </a:r>
+            <a:endParaRPr lang="en-US" dirty="0"/>
+          </a:p>
+        </p:txBody>
+      </p:sp>
     </p:spTree>
     <p:extLst>
       <p:ext uri="{BB962C8B-B14F-4D97-AF65-F5344CB8AC3E}">
         <p14:creationId xmlns:p14="http://schemas.microsoft.com/office/powerpoint/2010/main" val="211203042"/>
+      </p:ext>
+    </p:extLst>
+  </p:cSld>
+  <p:clrMapOvr>
+    <a:masterClrMapping/>
+  </p:clrMapOvr>
+</p:sld>
+</file>
+
+<file path=ppt/slides/slide2.xml><?xml version="1.0" encoding="utf-8"?>
+<p:sld xmlns:a="http://schemas.openxmlformats.org/drawingml/2006/main" xmlns:r="http://schemas.openxmlformats.org/officeDocument/2006/relationships" xmlns:p="http://schemas.openxmlformats.org/presentationml/2006/main">
+  <p:cSld>
+    <p:spTree>
+      <p:nvGrpSpPr>
+        <p:cNvPr id="1" name=""/>
+        <p:cNvGrpSpPr/>
+        <p:nvPr/>
+      </p:nvGrpSpPr>
+      <p:grpSpPr>
+        <a:xfrm>
+          <a:off x="0" y="0"/>
+          <a:ext cx="0" cy="0"/>
+          <a:chOff x="0" y="0"/>
+          <a:chExt cx="0" cy="0"/>
+        </a:xfrm>
+      </p:grpSpPr>
+      <p:pic>
+        <p:nvPicPr>
+          <p:cNvPr id="9" name="Picture 8"/>
+          <p:cNvPicPr>
+            <a:picLocks noChangeAspect="1"/>
+          </p:cNvPicPr>
+          <p:nvPr/>
+        </p:nvPicPr>
+        <p:blipFill>
+          <a:blip r:embed="rId2">
+            <a:extLst>
+              <a:ext uri="{28A0092B-C50C-407E-A947-70E740481C1C}">
+                <a14:useLocalDpi xmlns:a14="http://schemas.microsoft.com/office/drawing/2010/main" val="0"/>
+              </a:ext>
+            </a:extLst>
+          </a:blip>
+          <a:stretch>
+            <a:fillRect/>
+          </a:stretch>
+        </p:blipFill>
+        <p:spPr>
+          <a:xfrm>
+            <a:off x="806242" y="932833"/>
+            <a:ext cx="3792796" cy="3792796"/>
+          </a:xfrm>
+          <a:prstGeom prst="rect">
+            <a:avLst/>
+          </a:prstGeom>
+        </p:spPr>
+      </p:pic>
+      <p:pic>
+        <p:nvPicPr>
+          <p:cNvPr id="8" name="Picture 7"/>
+          <p:cNvPicPr>
+            <a:picLocks noChangeAspect="1"/>
+          </p:cNvPicPr>
+          <p:nvPr/>
+        </p:nvPicPr>
+        <p:blipFill>
+          <a:blip r:embed="rId3">
+            <a:extLst>
+              <a:ext uri="{28A0092B-C50C-407E-A947-70E740481C1C}">
+                <a14:useLocalDpi xmlns:a14="http://schemas.microsoft.com/office/drawing/2010/main" val="0"/>
+              </a:ext>
+            </a:extLst>
+          </a:blip>
+          <a:stretch>
+            <a:fillRect/>
+          </a:stretch>
+        </p:blipFill>
+        <p:spPr>
+          <a:xfrm>
+            <a:off x="4363065" y="927919"/>
+            <a:ext cx="3797710" cy="3797710"/>
+          </a:xfrm>
+          <a:prstGeom prst="rect">
+            <a:avLst/>
+          </a:prstGeom>
+        </p:spPr>
+      </p:pic>
+      <p:pic>
+        <p:nvPicPr>
+          <p:cNvPr id="7" name="Picture 6"/>
+          <p:cNvPicPr>
+            <a:picLocks noChangeAspect="1"/>
+          </p:cNvPicPr>
+          <p:nvPr/>
+        </p:nvPicPr>
+        <p:blipFill>
+          <a:blip r:embed="rId4">
+            <a:extLst>
+              <a:ext uri="{28A0092B-C50C-407E-A947-70E740481C1C}">
+                <a14:useLocalDpi xmlns:a14="http://schemas.microsoft.com/office/drawing/2010/main" val="0"/>
+              </a:ext>
+            </a:extLst>
+          </a:blip>
+          <a:stretch>
+            <a:fillRect/>
+          </a:stretch>
+        </p:blipFill>
+        <p:spPr>
+          <a:xfrm>
+            <a:off x="7929315" y="927919"/>
+            <a:ext cx="3797710" cy="3797710"/>
+          </a:xfrm>
+          <a:prstGeom prst="rect">
+            <a:avLst/>
+          </a:prstGeom>
+        </p:spPr>
+      </p:pic>
+      <p:sp>
+        <p:nvSpPr>
+          <p:cNvPr id="11" name="Rectangle 10"/>
+          <p:cNvSpPr/>
+          <p:nvPr/>
+        </p:nvSpPr>
+        <p:spPr>
+          <a:xfrm>
+            <a:off x="1212928" y="1017019"/>
+            <a:ext cx="10194058" cy="220397"/>
+          </a:xfrm>
+          <a:prstGeom prst="rect">
+            <a:avLst/>
+          </a:prstGeom>
+          <a:solidFill>
+            <a:schemeClr val="bg1"/>
+          </a:solidFill>
+          <a:ln>
+            <a:noFill/>
+          </a:ln>
+        </p:spPr>
+        <p:style>
+          <a:lnRef idx="2">
+            <a:schemeClr val="accent1">
+              <a:shade val="50000"/>
+            </a:schemeClr>
+          </a:lnRef>
+          <a:fillRef idx="1">
+            <a:schemeClr val="accent1"/>
+          </a:fillRef>
+          <a:effectRef idx="0">
+            <a:schemeClr val="accent1"/>
+          </a:effectRef>
+          <a:fontRef idx="minor">
+            <a:schemeClr val="lt1"/>
+          </a:fontRef>
+        </p:style>
+        <p:txBody>
+          <a:bodyPr rtlCol="0" anchor="ctr"/>
+          <a:lstStyle/>
+          <a:p>
+            <a:pPr algn="ctr"/>
+            <a:endParaRPr lang="en-US"/>
+          </a:p>
+        </p:txBody>
+      </p:sp>
+      <p:sp>
+        <p:nvSpPr>
+          <p:cNvPr id="13" name="Rectangle 12"/>
+          <p:cNvSpPr/>
+          <p:nvPr/>
+        </p:nvSpPr>
+        <p:spPr>
+          <a:xfrm>
+            <a:off x="11088332" y="957977"/>
+            <a:ext cx="318654" cy="249381"/>
+          </a:xfrm>
+          <a:prstGeom prst="rect">
+            <a:avLst/>
+          </a:prstGeom>
+          <a:solidFill>
+            <a:schemeClr val="bg1"/>
+          </a:solidFill>
+          <a:ln>
+            <a:noFill/>
+          </a:ln>
+        </p:spPr>
+        <p:style>
+          <a:lnRef idx="2">
+            <a:schemeClr val="accent1">
+              <a:shade val="50000"/>
+            </a:schemeClr>
+          </a:lnRef>
+          <a:fillRef idx="1">
+            <a:schemeClr val="accent1"/>
+          </a:fillRef>
+          <a:effectRef idx="0">
+            <a:schemeClr val="accent1"/>
+          </a:effectRef>
+          <a:fontRef idx="minor">
+            <a:schemeClr val="lt1"/>
+          </a:fontRef>
+        </p:style>
+        <p:txBody>
+          <a:bodyPr rtlCol="0" anchor="ctr"/>
+          <a:lstStyle/>
+          <a:p>
+            <a:pPr algn="ctr"/>
+            <a:endParaRPr lang="en-US"/>
+          </a:p>
+        </p:txBody>
+      </p:sp>
+      <p:sp>
+        <p:nvSpPr>
+          <p:cNvPr id="14" name="TextBox 13"/>
+          <p:cNvSpPr txBox="1"/>
+          <p:nvPr/>
+        </p:nvSpPr>
+        <p:spPr>
+          <a:xfrm>
+            <a:off x="1880358" y="1141614"/>
+            <a:ext cx="1950919" cy="276999"/>
+          </a:xfrm>
+          <a:prstGeom prst="rect">
+            <a:avLst/>
+          </a:prstGeom>
+          <a:noFill/>
+        </p:spPr>
+        <p:txBody>
+          <a:bodyPr wrap="none" rtlCol="0">
+            <a:spAutoFit/>
+          </a:bodyPr>
+          <a:lstStyle/>
+          <a:p>
+            <a:r>
+              <a:rPr lang="en-US" sz="1200" b="1" dirty="0" smtClean="0">
+                <a:latin typeface="Cambria Math" charset="0"/>
+                <a:ea typeface="Cambria Math" charset="0"/>
+                <a:cs typeface="Cambria Math" charset="0"/>
+              </a:rPr>
+              <a:t>MSE per Epoch for H1: 256</a:t>
+            </a:r>
+            <a:endParaRPr lang="en-US" sz="1200" b="1" dirty="0">
+              <a:latin typeface="Cambria Math" charset="0"/>
+              <a:ea typeface="Cambria Math" charset="0"/>
+              <a:cs typeface="Cambria Math" charset="0"/>
+            </a:endParaRPr>
+          </a:p>
+        </p:txBody>
+      </p:sp>
+      <p:sp>
+        <p:nvSpPr>
+          <p:cNvPr id="24" name="TextBox 23"/>
+          <p:cNvSpPr txBox="1"/>
+          <p:nvPr/>
+        </p:nvSpPr>
+        <p:spPr>
+          <a:xfrm>
+            <a:off x="5135283" y="1149079"/>
+            <a:ext cx="2536015" cy="276999"/>
+          </a:xfrm>
+          <a:prstGeom prst="rect">
+            <a:avLst/>
+          </a:prstGeom>
+          <a:noFill/>
+        </p:spPr>
+        <p:txBody>
+          <a:bodyPr wrap="none" rtlCol="0">
+            <a:spAutoFit/>
+          </a:bodyPr>
+          <a:lstStyle/>
+          <a:p>
+            <a:r>
+              <a:rPr lang="en-US" sz="1200" b="1" dirty="0" smtClean="0">
+                <a:latin typeface="Cambria Math" charset="0"/>
+                <a:ea typeface="Cambria Math" charset="0"/>
+                <a:cs typeface="Cambria Math" charset="0"/>
+              </a:rPr>
+              <a:t>MSE per Epoch for H1: 256, H2: 256</a:t>
+            </a:r>
+            <a:endParaRPr lang="en-US" sz="1200" b="1" dirty="0">
+              <a:latin typeface="Cambria Math" charset="0"/>
+              <a:ea typeface="Cambria Math" charset="0"/>
+              <a:cs typeface="Cambria Math" charset="0"/>
+            </a:endParaRPr>
+          </a:p>
+        </p:txBody>
+      </p:sp>
+      <p:sp>
+        <p:nvSpPr>
+          <p:cNvPr id="26" name="TextBox 25"/>
+          <p:cNvSpPr txBox="1"/>
+          <p:nvPr/>
+        </p:nvSpPr>
+        <p:spPr>
+          <a:xfrm>
+            <a:off x="8405459" y="1143626"/>
+            <a:ext cx="3121111" cy="276999"/>
+          </a:xfrm>
+          <a:prstGeom prst="rect">
+            <a:avLst/>
+          </a:prstGeom>
+          <a:noFill/>
+        </p:spPr>
+        <p:txBody>
+          <a:bodyPr wrap="none" rtlCol="0">
+            <a:spAutoFit/>
+          </a:bodyPr>
+          <a:lstStyle/>
+          <a:p>
+            <a:r>
+              <a:rPr lang="en-US" sz="1200" b="1" smtClean="0">
+                <a:latin typeface="Cambria Math" charset="0"/>
+                <a:ea typeface="Cambria Math" charset="0"/>
+                <a:cs typeface="Cambria Math" charset="0"/>
+              </a:rPr>
+              <a:t>MSE per Epoch for H1: 256, H2: 256, H3: 128</a:t>
+            </a:r>
+            <a:endParaRPr lang="en-US" sz="1200" b="1" dirty="0">
+              <a:latin typeface="Cambria Math" charset="0"/>
+              <a:ea typeface="Cambria Math" charset="0"/>
+              <a:cs typeface="Cambria Math" charset="0"/>
+            </a:endParaRPr>
+          </a:p>
+        </p:txBody>
+      </p:sp>
+      <p:cxnSp>
+        <p:nvCxnSpPr>
+          <p:cNvPr id="31" name="Straight Connector 30"/>
+          <p:cNvCxnSpPr/>
+          <p:nvPr/>
+        </p:nvCxnSpPr>
+        <p:spPr>
+          <a:xfrm flipH="1" flipV="1">
+            <a:off x="1258029" y="1939460"/>
+            <a:ext cx="704729" cy="5824"/>
+          </a:xfrm>
+          <a:prstGeom prst="line">
+            <a:avLst/>
+          </a:prstGeom>
+          <a:ln>
+            <a:solidFill>
+              <a:schemeClr val="bg1">
+                <a:lumMod val="65000"/>
+              </a:schemeClr>
+            </a:solidFill>
+            <a:prstDash val="dash"/>
+          </a:ln>
+        </p:spPr>
+        <p:style>
+          <a:lnRef idx="1">
+            <a:schemeClr val="accent1"/>
+          </a:lnRef>
+          <a:fillRef idx="0">
+            <a:schemeClr val="accent1"/>
+          </a:fillRef>
+          <a:effectRef idx="0">
+            <a:schemeClr val="accent1"/>
+          </a:effectRef>
+          <a:fontRef idx="minor">
+            <a:schemeClr val="tx1"/>
+          </a:fontRef>
+        </p:style>
+      </p:cxnSp>
+      <p:cxnSp>
+        <p:nvCxnSpPr>
+          <p:cNvPr id="34" name="Straight Connector 33"/>
+          <p:cNvCxnSpPr/>
+          <p:nvPr/>
+        </p:nvCxnSpPr>
+        <p:spPr>
+          <a:xfrm flipH="1" flipV="1">
+            <a:off x="4843722" y="1841419"/>
+            <a:ext cx="704729" cy="5824"/>
+          </a:xfrm>
+          <a:prstGeom prst="line">
+            <a:avLst/>
+          </a:prstGeom>
+          <a:ln>
+            <a:solidFill>
+              <a:schemeClr val="bg1">
+                <a:lumMod val="65000"/>
+              </a:schemeClr>
+            </a:solidFill>
+            <a:prstDash val="dash"/>
+          </a:ln>
+        </p:spPr>
+        <p:style>
+          <a:lnRef idx="1">
+            <a:schemeClr val="accent1"/>
+          </a:lnRef>
+          <a:fillRef idx="0">
+            <a:schemeClr val="accent1"/>
+          </a:fillRef>
+          <a:effectRef idx="0">
+            <a:schemeClr val="accent1"/>
+          </a:effectRef>
+          <a:fontRef idx="minor">
+            <a:schemeClr val="tx1"/>
+          </a:fontRef>
+        </p:style>
+      </p:cxnSp>
+      <p:cxnSp>
+        <p:nvCxnSpPr>
+          <p:cNvPr id="35" name="Straight Connector 34"/>
+          <p:cNvCxnSpPr/>
+          <p:nvPr/>
+        </p:nvCxnSpPr>
+        <p:spPr>
+          <a:xfrm flipH="1" flipV="1">
+            <a:off x="8405459" y="1677371"/>
+            <a:ext cx="2146194" cy="47563"/>
+          </a:xfrm>
+          <a:prstGeom prst="line">
+            <a:avLst/>
+          </a:prstGeom>
+          <a:ln>
+            <a:solidFill>
+              <a:schemeClr val="bg1">
+                <a:lumMod val="65000"/>
+              </a:schemeClr>
+            </a:solidFill>
+            <a:prstDash val="dash"/>
+          </a:ln>
+        </p:spPr>
+        <p:style>
+          <a:lnRef idx="1">
+            <a:schemeClr val="accent1"/>
+          </a:lnRef>
+          <a:fillRef idx="0">
+            <a:schemeClr val="accent1"/>
+          </a:fillRef>
+          <a:effectRef idx="0">
+            <a:schemeClr val="accent1"/>
+          </a:effectRef>
+          <a:fontRef idx="minor">
+            <a:schemeClr val="tx1"/>
+          </a:fontRef>
+        </p:style>
+      </p:cxnSp>
+    </p:spTree>
+    <p:extLst>
+      <p:ext uri="{BB962C8B-B14F-4D97-AF65-F5344CB8AC3E}">
+        <p14:creationId xmlns:p14="http://schemas.microsoft.com/office/powerpoint/2010/main" val="1892840465"/>
+      </p:ext>
+    </p:extLst>
+  </p:cSld>
+  <p:clrMapOvr>
+    <a:masterClrMapping/>
+  </p:clrMapOvr>
+</p:sld>
+</file>
+
+<file path=ppt/slides/slide3.xml><?xml version="1.0" encoding="utf-8"?>
+<p:sld xmlns:a="http://schemas.openxmlformats.org/drawingml/2006/main" xmlns:r="http://schemas.openxmlformats.org/officeDocument/2006/relationships" xmlns:p="http://schemas.openxmlformats.org/presentationml/2006/main">
+  <p:cSld>
+    <p:spTree>
+      <p:nvGrpSpPr>
+        <p:cNvPr id="1" name=""/>
+        <p:cNvGrpSpPr/>
+        <p:nvPr/>
+      </p:nvGrpSpPr>
+      <p:grpSpPr>
+        <a:xfrm>
+          <a:off x="0" y="0"/>
+          <a:ext cx="0" cy="0"/>
+          <a:chOff x="0" y="0"/>
+          <a:chExt cx="0" cy="0"/>
+        </a:xfrm>
+      </p:grpSpPr>
+      <p:grpSp>
+        <p:nvGrpSpPr>
+          <p:cNvPr id="31" name="Group 30"/>
+          <p:cNvGrpSpPr/>
+          <p:nvPr/>
+        </p:nvGrpSpPr>
+        <p:grpSpPr>
+          <a:xfrm>
+            <a:off x="505108" y="1242782"/>
+            <a:ext cx="5854700" cy="4394200"/>
+            <a:chOff x="238058" y="920053"/>
+            <a:chExt cx="5854700" cy="4394200"/>
+          </a:xfrm>
+        </p:grpSpPr>
+        <p:pic>
+          <p:nvPicPr>
+            <p:cNvPr id="4" name="Picture 3"/>
+            <p:cNvPicPr>
+              <a:picLocks noChangeAspect="1"/>
+            </p:cNvPicPr>
+            <p:nvPr/>
+          </p:nvPicPr>
+          <p:blipFill>
+            <a:blip r:embed="rId2">
+              <a:extLst>
+                <a:ext uri="{28A0092B-C50C-407E-A947-70E740481C1C}">
+                  <a14:useLocalDpi xmlns:a14="http://schemas.microsoft.com/office/drawing/2010/main" val="0"/>
+                </a:ext>
+              </a:extLst>
+            </a:blip>
+            <a:stretch>
+              <a:fillRect/>
+            </a:stretch>
+          </p:blipFill>
+          <p:spPr>
+            <a:xfrm>
+              <a:off x="238058" y="920053"/>
+              <a:ext cx="5854700" cy="4394200"/>
+            </a:xfrm>
+            <a:prstGeom prst="rect">
+              <a:avLst/>
+            </a:prstGeom>
+          </p:spPr>
+        </p:pic>
+        <p:grpSp>
+          <p:nvGrpSpPr>
+            <p:cNvPr id="30" name="Group 29"/>
+            <p:cNvGrpSpPr/>
+            <p:nvPr/>
+          </p:nvGrpSpPr>
+          <p:grpSpPr>
+            <a:xfrm>
+              <a:off x="942713" y="1097609"/>
+              <a:ext cx="4616176" cy="3708512"/>
+              <a:chOff x="942713" y="1097609"/>
+              <a:chExt cx="4616176" cy="3708512"/>
+            </a:xfrm>
+          </p:grpSpPr>
+          <p:pic>
+            <p:nvPicPr>
+              <p:cNvPr id="7" name="Picture 6"/>
+              <p:cNvPicPr>
+                <a:picLocks noChangeAspect="1"/>
+              </p:cNvPicPr>
+              <p:nvPr/>
+            </p:nvPicPr>
+            <p:blipFill rotWithShape="1">
+              <a:blip r:embed="rId3">
+                <a:extLst>
+                  <a:ext uri="{28A0092B-C50C-407E-A947-70E740481C1C}">
+                    <a14:useLocalDpi xmlns:a14="http://schemas.microsoft.com/office/drawing/2010/main" val="0"/>
+                  </a:ext>
+                </a:extLst>
+              </a:blip>
+              <a:srcRect r="1023"/>
+              <a:stretch/>
+            </p:blipFill>
+            <p:spPr>
+              <a:xfrm>
+                <a:off x="1022365" y="1507526"/>
+                <a:ext cx="4393578" cy="3298595"/>
+              </a:xfrm>
+              <a:prstGeom prst="rect">
+                <a:avLst/>
+              </a:prstGeom>
+            </p:spPr>
+          </p:pic>
+          <p:sp>
+            <p:nvSpPr>
+              <p:cNvPr id="23" name="TextBox 22"/>
+              <p:cNvSpPr txBox="1"/>
+              <p:nvPr/>
+            </p:nvSpPr>
+            <p:spPr>
+              <a:xfrm>
+                <a:off x="952819" y="1455476"/>
+                <a:ext cx="875561" cy="261610"/>
+              </a:xfrm>
+              <a:prstGeom prst="rect">
+                <a:avLst/>
+              </a:prstGeom>
+              <a:noFill/>
+            </p:spPr>
+            <p:txBody>
+              <a:bodyPr wrap="none" rtlCol="0">
+                <a:spAutoFit/>
+              </a:bodyPr>
+              <a:lstStyle/>
+              <a:p>
+                <a:r>
+                  <a:rPr lang="en-US" sz="1050" dirty="0" smtClean="0">
+                    <a:solidFill>
+                      <a:srgbClr val="7F51FC"/>
+                    </a:solidFill>
+                    <a:latin typeface="Arial Unicode MS" charset="0"/>
+                    <a:ea typeface="Arial Unicode MS" charset="0"/>
+                    <a:cs typeface="Arial Unicode MS" charset="0"/>
+                  </a:rPr>
+                  <a:t>AUC:0.876</a:t>
+                </a:r>
+                <a:endParaRPr lang="en-US" sz="1050" dirty="0">
+                  <a:solidFill>
+                    <a:srgbClr val="7F51FC"/>
+                  </a:solidFill>
+                  <a:latin typeface="Arial Unicode MS" charset="0"/>
+                  <a:ea typeface="Arial Unicode MS" charset="0"/>
+                  <a:cs typeface="Arial Unicode MS" charset="0"/>
+                </a:endParaRPr>
+              </a:p>
+            </p:txBody>
+          </p:sp>
+          <p:sp>
+            <p:nvSpPr>
+              <p:cNvPr id="24" name="TextBox 23"/>
+              <p:cNvSpPr txBox="1"/>
+              <p:nvPr/>
+            </p:nvSpPr>
+            <p:spPr>
+              <a:xfrm>
+                <a:off x="942713" y="1590278"/>
+                <a:ext cx="845103" cy="253916"/>
+              </a:xfrm>
+              <a:prstGeom prst="rect">
+                <a:avLst/>
+              </a:prstGeom>
+              <a:noFill/>
+            </p:spPr>
+            <p:txBody>
+              <a:bodyPr wrap="none" rtlCol="0">
+                <a:spAutoFit/>
+              </a:bodyPr>
+              <a:lstStyle/>
+              <a:p>
+                <a:r>
+                  <a:rPr lang="en-US" sz="1050" dirty="0" smtClean="0">
+                    <a:solidFill>
+                      <a:schemeClr val="accent2"/>
+                    </a:solidFill>
+                    <a:latin typeface="Arial Unicode MS" charset="0"/>
+                    <a:ea typeface="Arial Unicode MS" charset="0"/>
+                    <a:cs typeface="Arial Unicode MS" charset="0"/>
+                  </a:rPr>
+                  <a:t>AUC:0.906</a:t>
+                </a:r>
+                <a:endParaRPr lang="en-US" sz="1050" dirty="0">
+                  <a:solidFill>
+                    <a:schemeClr val="accent2"/>
+                  </a:solidFill>
+                  <a:latin typeface="Arial Unicode MS" charset="0"/>
+                  <a:ea typeface="Arial Unicode MS" charset="0"/>
+                  <a:cs typeface="Arial Unicode MS" charset="0"/>
+                </a:endParaRPr>
+              </a:p>
+            </p:txBody>
+          </p:sp>
+          <p:sp>
+            <p:nvSpPr>
+              <p:cNvPr id="25" name="Rectangle 24"/>
+              <p:cNvSpPr/>
+              <p:nvPr/>
+            </p:nvSpPr>
+            <p:spPr>
+              <a:xfrm>
+                <a:off x="4255972" y="4470406"/>
+                <a:ext cx="1210656" cy="324091"/>
+              </a:xfrm>
+              <a:prstGeom prst="rect">
+                <a:avLst/>
+              </a:prstGeom>
+              <a:solidFill>
+                <a:schemeClr val="bg1"/>
+              </a:solidFill>
+              <a:ln>
+                <a:noFill/>
+              </a:ln>
+            </p:spPr>
+            <p:style>
+              <a:lnRef idx="2">
+                <a:schemeClr val="accent1">
+                  <a:shade val="50000"/>
+                </a:schemeClr>
+              </a:lnRef>
+              <a:fillRef idx="1">
+                <a:schemeClr val="accent1"/>
+              </a:fillRef>
+              <a:effectRef idx="0">
+                <a:schemeClr val="accent1"/>
+              </a:effectRef>
+              <a:fontRef idx="minor">
+                <a:schemeClr val="lt1"/>
+              </a:fontRef>
+            </p:style>
+            <p:txBody>
+              <a:bodyPr rtlCol="0" anchor="ctr"/>
+              <a:lstStyle/>
+              <a:p>
+                <a:pPr algn="ctr"/>
+                <a:endParaRPr lang="en-US"/>
+              </a:p>
+            </p:txBody>
+          </p:sp>
+          <p:grpSp>
+            <p:nvGrpSpPr>
+              <p:cNvPr id="17" name="Group 16"/>
+              <p:cNvGrpSpPr/>
+              <p:nvPr/>
+            </p:nvGrpSpPr>
+            <p:grpSpPr>
+              <a:xfrm>
+                <a:off x="4426328" y="4312887"/>
+                <a:ext cx="1132561" cy="247860"/>
+                <a:chOff x="10495419" y="3465310"/>
+                <a:chExt cx="1126581" cy="247860"/>
+              </a:xfrm>
+            </p:grpSpPr>
+            <p:sp>
+              <p:nvSpPr>
+                <p:cNvPr id="14" name="Rectangle 13"/>
+                <p:cNvSpPr/>
+                <p:nvPr/>
+              </p:nvSpPr>
+              <p:spPr>
+                <a:xfrm>
+                  <a:off x="10495419" y="3493539"/>
+                  <a:ext cx="1061772" cy="219631"/>
+                </a:xfrm>
+                <a:prstGeom prst="rect">
+                  <a:avLst/>
+                </a:prstGeom>
+                <a:solidFill>
+                  <a:schemeClr val="bg1"/>
+                </a:solidFill>
+                <a:ln>
+                  <a:solidFill>
+                    <a:schemeClr val="bg1">
+                      <a:lumMod val="75000"/>
+                    </a:schemeClr>
+                  </a:solidFill>
+                </a:ln>
+                <a:effectLst>
+                  <a:outerShdw blurRad="50800" dist="38100" dir="5400000" algn="t" rotWithShape="0">
+                    <a:prstClr val="black">
+                      <a:alpha val="40000"/>
+                    </a:prstClr>
+                  </a:outerShdw>
+                </a:effectLst>
+              </p:spPr>
+              <p:style>
+                <a:lnRef idx="2">
+                  <a:schemeClr val="accent1">
+                    <a:shade val="50000"/>
+                  </a:schemeClr>
+                </a:lnRef>
+                <a:fillRef idx="1">
+                  <a:schemeClr val="accent1"/>
+                </a:fillRef>
+                <a:effectRef idx="0">
+                  <a:schemeClr val="accent1"/>
+                </a:effectRef>
+                <a:fontRef idx="minor">
+                  <a:schemeClr val="lt1"/>
+                </a:fontRef>
+              </p:style>
+              <p:txBody>
+                <a:bodyPr rtlCol="0" anchor="ctr"/>
+                <a:lstStyle/>
+                <a:p>
+                  <a:pPr algn="ctr"/>
+                  <a:endParaRPr lang="en-US"/>
+                </a:p>
+              </p:txBody>
+            </p:sp>
+            <p:sp>
+              <p:nvSpPr>
+                <p:cNvPr id="15" name="TextBox 14"/>
+                <p:cNvSpPr txBox="1"/>
+                <p:nvPr/>
+              </p:nvSpPr>
+              <p:spPr>
+                <a:xfrm>
+                  <a:off x="10762469" y="3465310"/>
+                  <a:ext cx="859531" cy="246221"/>
+                </a:xfrm>
+                <a:prstGeom prst="rect">
+                  <a:avLst/>
+                </a:prstGeom>
+                <a:noFill/>
+              </p:spPr>
+              <p:txBody>
+                <a:bodyPr wrap="none" rtlCol="0">
+                  <a:spAutoFit/>
+                </a:bodyPr>
+                <a:lstStyle/>
+                <a:p>
+                  <a:r>
+                    <a:rPr lang="en-US" sz="1000" dirty="0" smtClean="0">
+                      <a:latin typeface="Arial Unicode MS" charset="0"/>
+                      <a:ea typeface="Arial Unicode MS" charset="0"/>
+                      <a:cs typeface="Arial Unicode MS" charset="0"/>
+                    </a:rPr>
+                    <a:t>Pre-Trained</a:t>
+                  </a:r>
+                  <a:endParaRPr lang="en-US" sz="1000" dirty="0">
+                    <a:latin typeface="Arial Unicode MS" charset="0"/>
+                    <a:ea typeface="Arial Unicode MS" charset="0"/>
+                    <a:cs typeface="Arial Unicode MS" charset="0"/>
+                  </a:endParaRPr>
+                </a:p>
+              </p:txBody>
+            </p:sp>
+            <p:cxnSp>
+              <p:nvCxnSpPr>
+                <p:cNvPr id="16" name="Straight Connector 15"/>
+                <p:cNvCxnSpPr/>
+                <p:nvPr/>
+              </p:nvCxnSpPr>
+              <p:spPr>
+                <a:xfrm flipV="1">
+                  <a:off x="10534384" y="3601833"/>
+                  <a:ext cx="271820" cy="1585"/>
+                </a:xfrm>
+                <a:prstGeom prst="line">
+                  <a:avLst/>
+                </a:prstGeom>
+                <a:ln w="28575">
+                  <a:solidFill>
+                    <a:srgbClr val="7F51FC"/>
+                  </a:solidFill>
+                </a:ln>
+              </p:spPr>
+              <p:style>
+                <a:lnRef idx="1">
+                  <a:schemeClr val="accent1"/>
+                </a:lnRef>
+                <a:fillRef idx="0">
+                  <a:schemeClr val="accent1"/>
+                </a:fillRef>
+                <a:effectRef idx="0">
+                  <a:schemeClr val="accent1"/>
+                </a:effectRef>
+                <a:fontRef idx="minor">
+                  <a:schemeClr val="tx1"/>
+                </a:fontRef>
+              </p:style>
+            </p:cxnSp>
+          </p:grpSp>
+          <p:grpSp>
+            <p:nvGrpSpPr>
+              <p:cNvPr id="18" name="Group 17"/>
+              <p:cNvGrpSpPr/>
+              <p:nvPr/>
+            </p:nvGrpSpPr>
+            <p:grpSpPr>
+              <a:xfrm>
+                <a:off x="4428004" y="4553135"/>
+                <a:ext cx="1061772" cy="241362"/>
+                <a:chOff x="10495419" y="3465316"/>
+                <a:chExt cx="1061772" cy="247854"/>
+              </a:xfrm>
+            </p:grpSpPr>
+            <p:sp>
+              <p:nvSpPr>
+                <p:cNvPr id="19" name="Rectangle 18"/>
+                <p:cNvSpPr/>
+                <p:nvPr/>
+              </p:nvSpPr>
+              <p:spPr>
+                <a:xfrm>
+                  <a:off x="10495419" y="3493539"/>
+                  <a:ext cx="1061772" cy="219631"/>
+                </a:xfrm>
+                <a:prstGeom prst="rect">
+                  <a:avLst/>
+                </a:prstGeom>
+                <a:solidFill>
+                  <a:schemeClr val="bg1"/>
+                </a:solidFill>
+                <a:ln>
+                  <a:solidFill>
+                    <a:schemeClr val="bg1">
+                      <a:lumMod val="75000"/>
+                    </a:schemeClr>
+                  </a:solidFill>
+                </a:ln>
+                <a:effectLst>
+                  <a:outerShdw blurRad="50800" dist="38100" dir="5400000" algn="t" rotWithShape="0">
+                    <a:prstClr val="black">
+                      <a:alpha val="40000"/>
+                    </a:prstClr>
+                  </a:outerShdw>
+                </a:effectLst>
+              </p:spPr>
+              <p:style>
+                <a:lnRef idx="2">
+                  <a:schemeClr val="accent1">
+                    <a:shade val="50000"/>
+                  </a:schemeClr>
+                </a:lnRef>
+                <a:fillRef idx="1">
+                  <a:schemeClr val="accent1"/>
+                </a:fillRef>
+                <a:effectRef idx="0">
+                  <a:schemeClr val="accent1"/>
+                </a:effectRef>
+                <a:fontRef idx="minor">
+                  <a:schemeClr val="lt1"/>
+                </a:fontRef>
+              </p:style>
+              <p:txBody>
+                <a:bodyPr rtlCol="0" anchor="ctr"/>
+                <a:lstStyle/>
+                <a:p>
+                  <a:pPr algn="ctr"/>
+                  <a:endParaRPr lang="en-US"/>
+                </a:p>
+              </p:txBody>
+            </p:sp>
+            <p:sp>
+              <p:nvSpPr>
+                <p:cNvPr id="20" name="TextBox 19"/>
+                <p:cNvSpPr txBox="1"/>
+                <p:nvPr/>
+              </p:nvSpPr>
+              <p:spPr>
+                <a:xfrm>
+                  <a:off x="10762469" y="3465316"/>
+                  <a:ext cx="667170" cy="246213"/>
+                </a:xfrm>
+                <a:prstGeom prst="rect">
+                  <a:avLst/>
+                </a:prstGeom>
+                <a:noFill/>
+              </p:spPr>
+              <p:txBody>
+                <a:bodyPr wrap="none" rtlCol="0">
+                  <a:spAutoFit/>
+                </a:bodyPr>
+                <a:lstStyle/>
+                <a:p>
+                  <a:r>
+                    <a:rPr lang="en-US" sz="1000" dirty="0" smtClean="0">
+                      <a:latin typeface="Arial Unicode MS" charset="0"/>
+                      <a:ea typeface="Arial Unicode MS" charset="0"/>
+                      <a:cs typeface="Arial Unicode MS" charset="0"/>
+                    </a:rPr>
+                    <a:t>Random</a:t>
+                  </a:r>
+                  <a:endParaRPr lang="en-US" sz="1000" dirty="0">
+                    <a:latin typeface="Arial Unicode MS" charset="0"/>
+                    <a:ea typeface="Arial Unicode MS" charset="0"/>
+                    <a:cs typeface="Arial Unicode MS" charset="0"/>
+                  </a:endParaRPr>
+                </a:p>
+              </p:txBody>
+            </p:sp>
+            <p:cxnSp>
+              <p:nvCxnSpPr>
+                <p:cNvPr id="21" name="Straight Connector 20"/>
+                <p:cNvCxnSpPr/>
+                <p:nvPr/>
+              </p:nvCxnSpPr>
+              <p:spPr>
+                <a:xfrm flipV="1">
+                  <a:off x="10534384" y="3601833"/>
+                  <a:ext cx="271820" cy="1585"/>
+                </a:xfrm>
+                <a:prstGeom prst="line">
+                  <a:avLst/>
+                </a:prstGeom>
+                <a:ln w="28575">
+                  <a:solidFill>
+                    <a:schemeClr val="accent2"/>
+                  </a:solidFill>
+                </a:ln>
+              </p:spPr>
+              <p:style>
+                <a:lnRef idx="1">
+                  <a:schemeClr val="accent1"/>
+                </a:lnRef>
+                <a:fillRef idx="0">
+                  <a:schemeClr val="accent1"/>
+                </a:fillRef>
+                <a:effectRef idx="0">
+                  <a:schemeClr val="accent1"/>
+                </a:effectRef>
+                <a:fontRef idx="minor">
+                  <a:schemeClr val="tx1"/>
+                </a:fontRef>
+              </p:style>
+            </p:cxnSp>
+          </p:grpSp>
+          <p:sp>
+            <p:nvSpPr>
+              <p:cNvPr id="26" name="TextBox 25"/>
+              <p:cNvSpPr txBox="1"/>
+              <p:nvPr/>
+            </p:nvSpPr>
+            <p:spPr>
+              <a:xfrm>
+                <a:off x="2378535" y="1097609"/>
+                <a:ext cx="1877437" cy="307777"/>
+              </a:xfrm>
+              <a:prstGeom prst="rect">
+                <a:avLst/>
+              </a:prstGeom>
+              <a:solidFill>
+                <a:schemeClr val="bg1"/>
+              </a:solidFill>
+            </p:spPr>
+            <p:txBody>
+              <a:bodyPr wrap="none" rtlCol="0">
+                <a:spAutoFit/>
+              </a:bodyPr>
+              <a:lstStyle/>
+              <a:p>
+                <a:r>
+                  <a:rPr lang="en-US" sz="1400" smtClean="0">
+                    <a:latin typeface="Arial Unicode MS" charset="0"/>
+                    <a:ea typeface="Arial Unicode MS" charset="0"/>
+                    <a:cs typeface="Arial Unicode MS" charset="0"/>
+                  </a:rPr>
+                  <a:t>ROC Curves for NTN</a:t>
+                </a:r>
+                <a:endParaRPr lang="en-US" sz="1400" dirty="0">
+                  <a:latin typeface="Arial Unicode MS" charset="0"/>
+                  <a:ea typeface="Arial Unicode MS" charset="0"/>
+                  <a:cs typeface="Arial Unicode MS" charset="0"/>
+                </a:endParaRPr>
+              </a:p>
+            </p:txBody>
+          </p:sp>
+        </p:grpSp>
+      </p:grpSp>
+    </p:spTree>
+    <p:extLst>
+      <p:ext uri="{BB962C8B-B14F-4D97-AF65-F5344CB8AC3E}">
+        <p14:creationId xmlns:p14="http://schemas.microsoft.com/office/powerpoint/2010/main" val="1467215799"/>
+      </p:ext>
+    </p:extLst>
+  </p:cSld>
+  <p:clrMapOvr>
+    <a:masterClrMapping/>
+  </p:clrMapOvr>
+</p:sld>
+</file>
+
+<file path=ppt/slides/slide4.xml><?xml version="1.0" encoding="utf-8"?>
+<p:sld xmlns:a="http://schemas.openxmlformats.org/drawingml/2006/main" xmlns:r="http://schemas.openxmlformats.org/officeDocument/2006/relationships" xmlns:p="http://schemas.openxmlformats.org/presentationml/2006/main">
+  <p:cSld>
+    <p:spTree>
+      <p:nvGrpSpPr>
+        <p:cNvPr id="1" name=""/>
+        <p:cNvGrpSpPr/>
+        <p:nvPr/>
+      </p:nvGrpSpPr>
+      <p:grpSpPr>
+        <a:xfrm>
+          <a:off x="0" y="0"/>
+          <a:ext cx="0" cy="0"/>
+          <a:chOff x="0" y="0"/>
+          <a:chExt cx="0" cy="0"/>
+        </a:xfrm>
+      </p:grpSpPr>
+      <p:pic>
+        <p:nvPicPr>
+          <p:cNvPr id="4" name="Picture 3"/>
+          <p:cNvPicPr>
+            <a:picLocks noChangeAspect="1"/>
+          </p:cNvPicPr>
+          <p:nvPr/>
+        </p:nvPicPr>
+        <p:blipFill>
+          <a:blip r:embed="rId2">
+            <a:extLst>
+              <a:ext uri="{28A0092B-C50C-407E-A947-70E740481C1C}">
+                <a14:useLocalDpi xmlns:a14="http://schemas.microsoft.com/office/drawing/2010/main" val="0"/>
+              </a:ext>
+            </a:extLst>
+          </a:blip>
+          <a:stretch>
+            <a:fillRect/>
+          </a:stretch>
+        </p:blipFill>
+        <p:spPr>
+          <a:xfrm>
+            <a:off x="5472302" y="655369"/>
+            <a:ext cx="5460157" cy="4768025"/>
+          </a:xfrm>
+          <a:prstGeom prst="rect">
+            <a:avLst/>
+          </a:prstGeom>
+        </p:spPr>
+      </p:pic>
+      <p:pic>
+        <p:nvPicPr>
+          <p:cNvPr id="5" name="Picture 4"/>
+          <p:cNvPicPr>
+            <a:picLocks noChangeAspect="1"/>
+          </p:cNvPicPr>
+          <p:nvPr/>
+        </p:nvPicPr>
+        <p:blipFill rotWithShape="1">
+          <a:blip r:embed="rId3">
+            <a:extLst>
+              <a:ext uri="{28A0092B-C50C-407E-A947-70E740481C1C}">
+                <a14:useLocalDpi xmlns:a14="http://schemas.microsoft.com/office/drawing/2010/main" val="0"/>
+              </a:ext>
+            </a:extLst>
+          </a:blip>
+          <a:srcRect r="2315"/>
+          <a:stretch/>
+        </p:blipFill>
+        <p:spPr>
+          <a:xfrm>
+            <a:off x="664429" y="920053"/>
+            <a:ext cx="4984915" cy="4117662"/>
+          </a:xfrm>
+          <a:prstGeom prst="rect">
+            <a:avLst/>
+          </a:prstGeom>
+        </p:spPr>
+      </p:pic>
+      <p:pic>
+        <p:nvPicPr>
+          <p:cNvPr id="6" name="Picture 5"/>
+          <p:cNvPicPr>
+            <a:picLocks noChangeAspect="1"/>
+          </p:cNvPicPr>
+          <p:nvPr/>
+        </p:nvPicPr>
+        <p:blipFill rotWithShape="1">
+          <a:blip r:embed="rId2">
+            <a:extLst>
+              <a:ext uri="{28A0092B-C50C-407E-A947-70E740481C1C}">
+                <a14:useLocalDpi xmlns:a14="http://schemas.microsoft.com/office/drawing/2010/main" val="0"/>
+              </a:ext>
+            </a:extLst>
+          </a:blip>
+          <a:srcRect b="89914"/>
+          <a:stretch/>
+        </p:blipFill>
+        <p:spPr>
+          <a:xfrm>
+            <a:off x="5649344" y="783130"/>
+            <a:ext cx="5460157" cy="480894"/>
+          </a:xfrm>
+          <a:prstGeom prst="rect">
+            <a:avLst/>
+          </a:prstGeom>
+        </p:spPr>
+      </p:pic>
+      <p:pic>
+        <p:nvPicPr>
+          <p:cNvPr id="7" name="Picture 6"/>
+          <p:cNvPicPr>
+            <a:picLocks noChangeAspect="1"/>
+          </p:cNvPicPr>
+          <p:nvPr/>
+        </p:nvPicPr>
+        <p:blipFill rotWithShape="1">
+          <a:blip r:embed="rId2">
+            <a:extLst>
+              <a:ext uri="{28A0092B-C50C-407E-A947-70E740481C1C}">
+                <a14:useLocalDpi xmlns:a14="http://schemas.microsoft.com/office/drawing/2010/main" val="0"/>
+              </a:ext>
+            </a:extLst>
+          </a:blip>
+          <a:srcRect t="91911"/>
+          <a:stretch/>
+        </p:blipFill>
+        <p:spPr>
+          <a:xfrm>
+            <a:off x="5649344" y="4889798"/>
+            <a:ext cx="5460157" cy="385678"/>
+          </a:xfrm>
+          <a:prstGeom prst="rect">
+            <a:avLst/>
+          </a:prstGeom>
+        </p:spPr>
+      </p:pic>
+    </p:spTree>
+    <p:extLst>
+      <p:ext uri="{BB962C8B-B14F-4D97-AF65-F5344CB8AC3E}">
+        <p14:creationId xmlns:p14="http://schemas.microsoft.com/office/powerpoint/2010/main" val="242305386"/>
       </p:ext>
     </p:extLst>
   </p:cSld>
@@ -6798,4 +8501,265 @@
     </a:ext>
   </a:extLst>
 </a:theme>
+</file>
+
+<file path=ppt/theme/theme2.xml><?xml version="1.0" encoding="utf-8"?>
+<a:theme xmlns:a="http://schemas.openxmlformats.org/drawingml/2006/main" name="Office Theme">
+  <a:themeElements>
+    <a:clrScheme name="Office">
+      <a:dk1>
+        <a:sysClr val="windowText" lastClr="000000"/>
+      </a:dk1>
+      <a:lt1>
+        <a:sysClr val="window" lastClr="FFFFFF"/>
+      </a:lt1>
+      <a:dk2>
+        <a:srgbClr val="44546A"/>
+      </a:dk2>
+      <a:lt2>
+        <a:srgbClr val="E7E6E6"/>
+      </a:lt2>
+      <a:accent1>
+        <a:srgbClr val="4472C4"/>
+      </a:accent1>
+      <a:accent2>
+        <a:srgbClr val="ED7D31"/>
+      </a:accent2>
+      <a:accent3>
+        <a:srgbClr val="A5A5A5"/>
+      </a:accent3>
+      <a:accent4>
+        <a:srgbClr val="FFC000"/>
+      </a:accent4>
+      <a:accent5>
+        <a:srgbClr val="5B9BD5"/>
+      </a:accent5>
+      <a:accent6>
+        <a:srgbClr val="70AD47"/>
+      </a:accent6>
+      <a:hlink>
+        <a:srgbClr val="0563C1"/>
+      </a:hlink>
+      <a:folHlink>
+        <a:srgbClr val="954F72"/>
+      </a:folHlink>
+    </a:clrScheme>
+    <a:fontScheme name="Office">
+      <a:majorFont>
+        <a:latin typeface="Calibri Light" panose="020F0302020204030204"/>
+        <a:ea typeface=""/>
+        <a:cs typeface=""/>
+        <a:font script="Jpan" typeface="Yu Gothic Light"/>
+        <a:font script="Hang" typeface="맑은 고딕"/>
+        <a:font script="Hans" typeface="DengXian Light"/>
+        <a:font script="Hant" typeface="新細明體"/>
+        <a:font script="Arab" typeface="Times New Roman"/>
+        <a:font script="Hebr" typeface="Times New Roman"/>
+        <a:font script="Thai" typeface="Angsana New"/>
+        <a:font script="Ethi" typeface="Nyala"/>
+        <a:font script="Beng" typeface="Vrinda"/>
+        <a:font script="Gujr" typeface="Shruti"/>
+        <a:font script="Khmr" typeface="MoolBoran"/>
+        <a:font script="Knda" typeface="Tunga"/>
+        <a:font script="Guru" typeface="Raavi"/>
+        <a:font script="Cans" typeface="Euphemia"/>
+        <a:font script="Cher" typeface="Plantagenet Cherokee"/>
+        <a:font script="Yiii" typeface="Microsoft Yi Baiti"/>
+        <a:font script="Tibt" typeface="Microsoft Himalaya"/>
+        <a:font script="Thaa" typeface="MV Boli"/>
+        <a:font script="Deva" typeface="Mangal"/>
+        <a:font script="Telu" typeface="Gautami"/>
+        <a:font script="Taml" typeface="Latha"/>
+        <a:font script="Syrc" typeface="Estrangelo Edessa"/>
+        <a:font script="Orya" typeface="Kalinga"/>
+        <a:font script="Mlym" typeface="Kartika"/>
+        <a:font script="Laoo" typeface="DokChampa"/>
+        <a:font script="Sinh" typeface="Iskoola Pota"/>
+        <a:font script="Mong" typeface="Mongolian Baiti"/>
+        <a:font script="Viet" typeface="Times New Roman"/>
+        <a:font script="Uigh" typeface="Microsoft Uighur"/>
+        <a:font script="Geor" typeface="Sylfaen"/>
+      </a:majorFont>
+      <a:minorFont>
+        <a:latin typeface="Calibri" panose="020F0502020204030204"/>
+        <a:ea typeface=""/>
+        <a:cs typeface=""/>
+        <a:font script="Jpan" typeface="Yu Gothic"/>
+        <a:font script="Hang" typeface="맑은 고딕"/>
+        <a:font script="Hans" typeface="DengXian"/>
+        <a:font script="Hant" typeface="新細明體"/>
+        <a:font script="Arab" typeface="Arial"/>
+        <a:font script="Hebr" typeface="Arial"/>
+        <a:font script="Thai" typeface="Cordia New"/>
+        <a:font script="Ethi" typeface="Nyala"/>
+        <a:font script="Beng" typeface="Vrinda"/>
+        <a:font script="Gujr" typeface="Shruti"/>
+        <a:font script="Khmr" typeface="DaunPenh"/>
+        <a:font script="Knda" typeface="Tunga"/>
+        <a:font script="Guru" typeface="Raavi"/>
+        <a:font script="Cans" typeface="Euphemia"/>
+        <a:font script="Cher" typeface="Plantagenet Cherokee"/>
+        <a:font script="Yiii" typeface="Microsoft Yi Baiti"/>
+        <a:font script="Tibt" typeface="Microsoft Himalaya"/>
+        <a:font script="Thaa" typeface="MV Boli"/>
+        <a:font script="Deva" typeface="Mangal"/>
+        <a:font script="Telu" typeface="Gautami"/>
+        <a:font script="Taml" typeface="Latha"/>
+        <a:font script="Syrc" typeface="Estrangelo Edessa"/>
+        <a:font script="Orya" typeface="Kalinga"/>
+        <a:font script="Mlym" typeface="Kartika"/>
+        <a:font script="Laoo" typeface="DokChampa"/>
+        <a:font script="Sinh" typeface="Iskoola Pota"/>
+        <a:font script="Mong" typeface="Mongolian Baiti"/>
+        <a:font script="Viet" typeface="Arial"/>
+        <a:font script="Uigh" typeface="Microsoft Uighur"/>
+        <a:font script="Geor" typeface="Sylfaen"/>
+      </a:minorFont>
+    </a:fontScheme>
+    <a:fmtScheme name="Office">
+      <a:fillStyleLst>
+        <a:solidFill>
+          <a:schemeClr val="phClr"/>
+        </a:solidFill>
+        <a:gradFill rotWithShape="1">
+          <a:gsLst>
+            <a:gs pos="0">
+              <a:schemeClr val="phClr">
+                <a:lumMod val="110000"/>
+                <a:satMod val="105000"/>
+                <a:tint val="67000"/>
+              </a:schemeClr>
+            </a:gs>
+            <a:gs pos="50000">
+              <a:schemeClr val="phClr">
+                <a:lumMod val="105000"/>
+                <a:satMod val="103000"/>
+                <a:tint val="73000"/>
+              </a:schemeClr>
+            </a:gs>
+            <a:gs pos="100000">
+              <a:schemeClr val="phClr">
+                <a:lumMod val="105000"/>
+                <a:satMod val="109000"/>
+                <a:tint val="81000"/>
+              </a:schemeClr>
+            </a:gs>
+          </a:gsLst>
+          <a:lin ang="5400000" scaled="0"/>
+        </a:gradFill>
+        <a:gradFill rotWithShape="1">
+          <a:gsLst>
+            <a:gs pos="0">
+              <a:schemeClr val="phClr">
+                <a:satMod val="103000"/>
+                <a:lumMod val="102000"/>
+                <a:tint val="94000"/>
+              </a:schemeClr>
+            </a:gs>
+            <a:gs pos="50000">
+              <a:schemeClr val="phClr">
+                <a:satMod val="110000"/>
+                <a:lumMod val="100000"/>
+                <a:shade val="100000"/>
+              </a:schemeClr>
+            </a:gs>
+            <a:gs pos="100000">
+              <a:schemeClr val="phClr">
+                <a:lumMod val="99000"/>
+                <a:satMod val="120000"/>
+                <a:shade val="78000"/>
+              </a:schemeClr>
+            </a:gs>
+          </a:gsLst>
+          <a:lin ang="5400000" scaled="0"/>
+        </a:gradFill>
+      </a:fillStyleLst>
+      <a:lnStyleLst>
+        <a:ln w="6350" cap="flat" cmpd="sng" algn="ctr">
+          <a:solidFill>
+            <a:schemeClr val="phClr"/>
+          </a:solidFill>
+          <a:prstDash val="solid"/>
+          <a:miter lim="800000"/>
+        </a:ln>
+        <a:ln w="12700" cap="flat" cmpd="sng" algn="ctr">
+          <a:solidFill>
+            <a:schemeClr val="phClr"/>
+          </a:solidFill>
+          <a:prstDash val="solid"/>
+          <a:miter lim="800000"/>
+        </a:ln>
+        <a:ln w="19050" cap="flat" cmpd="sng" algn="ctr">
+          <a:solidFill>
+            <a:schemeClr val="phClr"/>
+          </a:solidFill>
+          <a:prstDash val="solid"/>
+          <a:miter lim="800000"/>
+        </a:ln>
+      </a:lnStyleLst>
+      <a:effectStyleLst>
+        <a:effectStyle>
+          <a:effectLst/>
+        </a:effectStyle>
+        <a:effectStyle>
+          <a:effectLst/>
+        </a:effectStyle>
+        <a:effectStyle>
+          <a:effectLst>
+            <a:outerShdw blurRad="57150" dist="19050" dir="5400000" algn="ctr" rotWithShape="0">
+              <a:srgbClr val="000000">
+                <a:alpha val="63000"/>
+              </a:srgbClr>
+            </a:outerShdw>
+          </a:effectLst>
+        </a:effectStyle>
+      </a:effectStyleLst>
+      <a:bgFillStyleLst>
+        <a:solidFill>
+          <a:schemeClr val="phClr"/>
+        </a:solidFill>
+        <a:solidFill>
+          <a:schemeClr val="phClr">
+            <a:tint val="95000"/>
+            <a:satMod val="170000"/>
+          </a:schemeClr>
+        </a:solidFill>
+        <a:gradFill rotWithShape="1">
+          <a:gsLst>
+            <a:gs pos="0">
+              <a:schemeClr val="phClr">
+                <a:tint val="93000"/>
+                <a:satMod val="150000"/>
+                <a:shade val="98000"/>
+                <a:lumMod val="102000"/>
+              </a:schemeClr>
+            </a:gs>
+            <a:gs pos="50000">
+              <a:schemeClr val="phClr">
+                <a:tint val="98000"/>
+                <a:satMod val="130000"/>
+                <a:shade val="90000"/>
+                <a:lumMod val="103000"/>
+              </a:schemeClr>
+            </a:gs>
+            <a:gs pos="100000">
+              <a:schemeClr val="phClr">
+                <a:shade val="63000"/>
+                <a:satMod val="120000"/>
+              </a:schemeClr>
+            </a:gs>
+          </a:gsLst>
+          <a:lin ang="5400000" scaled="0"/>
+        </a:gradFill>
+      </a:bgFillStyleLst>
+    </a:fmtScheme>
+  </a:themeElements>
+  <a:objectDefaults/>
+  <a:extraClrSchemeLst/>
+  <a:extLst>
+    <a:ext uri="{05A4C25C-085E-4340-85A3-A5531E510DB2}">
+      <thm15:themeFamily xmlns:thm15="http://schemas.microsoft.com/office/thememl/2012/main" name="Office Theme" id="{62F939B6-93AF-4DB8-9C6B-D6C7DFDC589F}" vid="{4A3C46E8-61CC-4603-A589-7422A47A8E4A}"/>
+    </a:ext>
+  </a:extLst>
+</a:theme>
 </file>
</xml_diff>